<commit_message>
Upd: add collections theme
Додано блок тем "Колекції". Оновлено інші файлики, де було помічено косяки.
</commit_message>
<xml_diff>
--- a/Java Урок 1 Змінні. Перетворення типів.pptx
+++ b/Java Урок 1 Змінні. Перетворення типів.pptx
@@ -238,7 +238,7 @@
           <a:p>
             <a:fld id="{8563BCD5-BA93-4EE2-99D7-9182F9B44AE3}" type="datetimeFigureOut">
               <a:rPr lang="uk-UA" smtClean="0"/>
-              <a:t>21.12.2023</a:t>
+              <a:t>05.01.2024</a:t>
             </a:fld>
             <a:endParaRPr lang="uk-UA"/>
           </a:p>
@@ -875,7 +875,7 @@
           <a:p>
             <a:fld id="{6113F138-7681-4725-9E20-940499728D31}" type="datetimeFigureOut">
               <a:rPr lang="uk-UA" smtClean="0"/>
-              <a:t>21.12.2023</a:t>
+              <a:t>05.01.2024</a:t>
             </a:fld>
             <a:endParaRPr lang="uk-UA"/>
           </a:p>
@@ -1075,7 +1075,7 @@
           <a:p>
             <a:fld id="{6113F138-7681-4725-9E20-940499728D31}" type="datetimeFigureOut">
               <a:rPr lang="uk-UA" smtClean="0"/>
-              <a:t>21.12.2023</a:t>
+              <a:t>05.01.2024</a:t>
             </a:fld>
             <a:endParaRPr lang="uk-UA"/>
           </a:p>
@@ -1285,7 +1285,7 @@
           <a:p>
             <a:fld id="{6113F138-7681-4725-9E20-940499728D31}" type="datetimeFigureOut">
               <a:rPr lang="uk-UA" smtClean="0"/>
-              <a:t>21.12.2023</a:t>
+              <a:t>05.01.2024</a:t>
             </a:fld>
             <a:endParaRPr lang="uk-UA"/>
           </a:p>
@@ -1608,7 +1608,7 @@
           <a:p>
             <a:fld id="{6113F138-7681-4725-9E20-940499728D31}" type="datetimeFigureOut">
               <a:rPr lang="uk-UA" smtClean="0"/>
-              <a:t>21.12.2023</a:t>
+              <a:t>05.01.2024</a:t>
             </a:fld>
             <a:endParaRPr lang="uk-UA"/>
           </a:p>
@@ -1884,7 +1884,7 @@
           <a:p>
             <a:fld id="{6113F138-7681-4725-9E20-940499728D31}" type="datetimeFigureOut">
               <a:rPr lang="uk-UA" smtClean="0"/>
-              <a:t>21.12.2023</a:t>
+              <a:t>05.01.2024</a:t>
             </a:fld>
             <a:endParaRPr lang="uk-UA"/>
           </a:p>
@@ -2152,7 +2152,7 @@
           <a:p>
             <a:fld id="{6113F138-7681-4725-9E20-940499728D31}" type="datetimeFigureOut">
               <a:rPr lang="uk-UA" smtClean="0"/>
-              <a:t>21.12.2023</a:t>
+              <a:t>05.01.2024</a:t>
             </a:fld>
             <a:endParaRPr lang="uk-UA"/>
           </a:p>
@@ -2567,7 +2567,7 @@
           <a:p>
             <a:fld id="{6113F138-7681-4725-9E20-940499728D31}" type="datetimeFigureOut">
               <a:rPr lang="uk-UA" smtClean="0"/>
-              <a:t>21.12.2023</a:t>
+              <a:t>05.01.2024</a:t>
             </a:fld>
             <a:endParaRPr lang="uk-UA"/>
           </a:p>
@@ -2709,7 +2709,7 @@
           <a:p>
             <a:fld id="{6113F138-7681-4725-9E20-940499728D31}" type="datetimeFigureOut">
               <a:rPr lang="uk-UA" smtClean="0"/>
-              <a:t>21.12.2023</a:t>
+              <a:t>05.01.2024</a:t>
             </a:fld>
             <a:endParaRPr lang="uk-UA"/>
           </a:p>
@@ -2822,7 +2822,7 @@
           <a:p>
             <a:fld id="{6113F138-7681-4725-9E20-940499728D31}" type="datetimeFigureOut">
               <a:rPr lang="uk-UA" smtClean="0"/>
-              <a:t>21.12.2023</a:t>
+              <a:t>05.01.2024</a:t>
             </a:fld>
             <a:endParaRPr lang="uk-UA"/>
           </a:p>
@@ -3135,7 +3135,7 @@
           <a:p>
             <a:fld id="{6113F138-7681-4725-9E20-940499728D31}" type="datetimeFigureOut">
               <a:rPr lang="uk-UA" smtClean="0"/>
-              <a:t>21.12.2023</a:t>
+              <a:t>05.01.2024</a:t>
             </a:fld>
             <a:endParaRPr lang="uk-UA"/>
           </a:p>
@@ -3424,7 +3424,7 @@
           <a:p>
             <a:fld id="{6113F138-7681-4725-9E20-940499728D31}" type="datetimeFigureOut">
               <a:rPr lang="uk-UA" smtClean="0"/>
-              <a:t>21.12.2023</a:t>
+              <a:t>05.01.2024</a:t>
             </a:fld>
             <a:endParaRPr lang="uk-UA"/>
           </a:p>
@@ -3667,7 +3667,7 @@
           <a:p>
             <a:fld id="{6113F138-7681-4725-9E20-940499728D31}" type="datetimeFigureOut">
               <a:rPr lang="uk-UA" smtClean="0"/>
-              <a:t>21.12.2023</a:t>
+              <a:t>05.01.2024</a:t>
             </a:fld>
             <a:endParaRPr lang="uk-UA"/>
           </a:p>
@@ -5464,7 +5464,7 @@
           <a:graphicData uri="http://schemas.openxmlformats.org/presentationml/2006/ole">
             <mc:AlternateContent xmlns:mc="http://schemas.openxmlformats.org/markup-compatibility/2006">
               <mc:Choice xmlns:v="urn:schemas-microsoft-com:vml" Requires="v">
-                <p:oleObj spid="_x0000_s1080" name="Visio" r:id="rId4" imgW="3990928" imgH="695578" progId="Visio.Drawing.11">
+                <p:oleObj spid="_x0000_s1092" name="Visio" r:id="rId4" imgW="3990928" imgH="695578" progId="Visio.Drawing.11">
                   <p:embed/>
                 </p:oleObj>
               </mc:Choice>
@@ -5547,7 +5547,7 @@
           <a:graphicData uri="http://schemas.openxmlformats.org/presentationml/2006/ole">
             <mc:AlternateContent xmlns:mc="http://schemas.openxmlformats.org/markup-compatibility/2006">
               <mc:Choice xmlns:v="urn:schemas-microsoft-com:vml" Requires="v">
-                <p:oleObj spid="_x0000_s1081" name="Visio" r:id="rId6" imgW="2438433" imgH="876555" progId="Visio.Drawing.11">
+                <p:oleObj spid="_x0000_s1093" name="Visio" r:id="rId6" imgW="2438433" imgH="876555" progId="Visio.Drawing.11">
                   <p:embed/>
                 </p:oleObj>
               </mc:Choice>
@@ -5630,7 +5630,7 @@
           <a:graphicData uri="http://schemas.openxmlformats.org/presentationml/2006/ole">
             <mc:AlternateContent xmlns:mc="http://schemas.openxmlformats.org/markup-compatibility/2006">
               <mc:Choice xmlns:v="urn:schemas-microsoft-com:vml" Requires="v">
-                <p:oleObj spid="_x0000_s1082" name="Visio" r:id="rId8" imgW="4267152" imgH="1790744" progId="Visio.Drawing.11">
+                <p:oleObj spid="_x0000_s1094" name="Visio" r:id="rId8" imgW="4267152" imgH="1790744" progId="Visio.Drawing.11">
                   <p:embed/>
                 </p:oleObj>
               </mc:Choice>
@@ -12575,7 +12575,7 @@
           <a:graphicData uri="http://schemas.openxmlformats.org/presentationml/2006/ole">
             <mc:AlternateContent xmlns:mc="http://schemas.openxmlformats.org/markup-compatibility/2006">
               <mc:Choice xmlns:v="urn:schemas-microsoft-com:vml" Requires="v">
-                <p:oleObj spid="_x0000_s2114" name="Visio" r:id="rId3" imgW="4286521" imgH="990723" progId="Visio.Drawing.11">
+                <p:oleObj spid="_x0000_s2130" name="Visio" r:id="rId3" imgW="4286521" imgH="990723" progId="Visio.Drawing.11">
                   <p:embed/>
                 </p:oleObj>
               </mc:Choice>
@@ -12689,7 +12689,7 @@
           <a:graphicData uri="http://schemas.openxmlformats.org/presentationml/2006/ole">
             <mc:AlternateContent xmlns:mc="http://schemas.openxmlformats.org/markup-compatibility/2006">
               <mc:Choice xmlns:v="urn:schemas-microsoft-com:vml" Requires="v">
-                <p:oleObj spid="_x0000_s2115" name="Visio" r:id="rId5" imgW="6010393" imgH="1257538" progId="Visio.Drawing.11">
+                <p:oleObj spid="_x0000_s2131" name="Visio" r:id="rId5" imgW="6010393" imgH="1257538" progId="Visio.Drawing.11">
                   <p:embed/>
                 </p:oleObj>
               </mc:Choice>
@@ -12776,7 +12776,7 @@
           <a:graphicData uri="http://schemas.openxmlformats.org/presentationml/2006/ole">
             <mc:AlternateContent xmlns:mc="http://schemas.openxmlformats.org/markup-compatibility/2006">
               <mc:Choice xmlns:v="urn:schemas-microsoft-com:vml" Requires="v">
-                <p:oleObj spid="_x0000_s2116" name="Visio" r:id="rId7" imgW="2600546" imgH="904886" progId="Visio.Drawing.11">
+                <p:oleObj spid="_x0000_s2132" name="Visio" r:id="rId7" imgW="2600546" imgH="904886" progId="Visio.Drawing.11">
                   <p:embed/>
                 </p:oleObj>
               </mc:Choice>
@@ -12853,7 +12853,7 @@
           <a:graphicData uri="http://schemas.openxmlformats.org/presentationml/2006/ole">
             <mc:AlternateContent xmlns:mc="http://schemas.openxmlformats.org/markup-compatibility/2006">
               <mc:Choice xmlns:v="urn:schemas-microsoft-com:vml" Requires="v">
-                <p:oleObj spid="_x0000_s2117" name="Visio" r:id="rId9" imgW="1409752" imgH="600016" progId="Visio.Drawing.11">
+                <p:oleObj spid="_x0000_s2133" name="Visio" r:id="rId9" imgW="1409752" imgH="600016" progId="Visio.Drawing.11">
                   <p:embed/>
                 </p:oleObj>
               </mc:Choice>

</xml_diff>